<commit_message>
-fix mobile & algorithm
</commit_message>
<xml_diff>
--- a/doc/Algorithm.pptx
+++ b/doc/Algorithm.pptx
@@ -205,7 +205,7 @@
           <a:p>
             <a:fld id="{C1092C62-4EDE-48C0-A8E9-F05660212F7E}" type="datetimeFigureOut">
               <a:rPr lang="en-US" smtClean="0"/>
-              <a:t>8/22/2015</a:t>
+              <a:t>8/23/2015</a:t>
             </a:fld>
             <a:endParaRPr lang="en-US"/>
           </a:p>
@@ -1267,7 +1267,7 @@
           <a:p>
             <a:fld id="{A4332FA6-9BA6-4B4F-AE99-90F88A80269F}" type="datetime1">
               <a:rPr lang="en-US" smtClean="0"/>
-              <a:t>8/22/2015</a:t>
+              <a:t>8/23/2015</a:t>
             </a:fld>
             <a:endParaRPr lang="en-US" dirty="0"/>
           </a:p>
@@ -1523,7 +1523,7 @@
           <a:p>
             <a:fld id="{B7A5EE82-0FFF-48EF-A2C5-439DDF04C83A}" type="datetime1">
               <a:rPr lang="en-US" smtClean="0"/>
-              <a:t>8/22/2015</a:t>
+              <a:t>8/23/2015</a:t>
             </a:fld>
             <a:endParaRPr lang="en-US" dirty="0"/>
           </a:p>
@@ -1842,7 +1842,7 @@
           <a:p>
             <a:fld id="{ACDB6D9D-800F-49BB-8FF9-94A9F32541C8}" type="datetime1">
               <a:rPr lang="en-US" smtClean="0"/>
-              <a:t>8/22/2015</a:t>
+              <a:t>8/23/2015</a:t>
             </a:fld>
             <a:endParaRPr lang="en-US" dirty="0"/>
           </a:p>
@@ -2181,7 +2181,7 @@
           <a:p>
             <a:fld id="{ACDB6D9D-800F-49BB-8FF9-94A9F32541C8}" type="datetime1">
               <a:rPr lang="en-US" smtClean="0"/>
-              <a:t>8/22/2015</a:t>
+              <a:t>8/23/2015</a:t>
             </a:fld>
             <a:endParaRPr lang="en-US" dirty="0"/>
           </a:p>
@@ -2501,7 +2501,7 @@
           <a:p>
             <a:fld id="{ACDB6D9D-800F-49BB-8FF9-94A9F32541C8}" type="datetime1">
               <a:rPr lang="en-US" smtClean="0"/>
-              <a:t>8/22/2015</a:t>
+              <a:t>8/23/2015</a:t>
             </a:fld>
             <a:endParaRPr lang="en-US" dirty="0"/>
           </a:p>
@@ -2900,7 +2900,7 @@
           <a:p>
             <a:fld id="{ACDB6D9D-800F-49BB-8FF9-94A9F32541C8}" type="datetime1">
               <a:rPr lang="en-US" smtClean="0"/>
-              <a:t>8/22/2015</a:t>
+              <a:t>8/23/2015</a:t>
             </a:fld>
             <a:endParaRPr lang="en-US" dirty="0"/>
           </a:p>
@@ -3076,7 +3076,7 @@
           <a:p>
             <a:fld id="{51CF433C-D46C-4579-BA0E-9196B0E6405F}" type="datetime1">
               <a:rPr lang="en-US" smtClean="0"/>
-              <a:t>8/22/2015</a:t>
+              <a:t>8/23/2015</a:t>
             </a:fld>
             <a:endParaRPr lang="en-US" dirty="0"/>
           </a:p>
@@ -3260,7 +3260,7 @@
           <a:p>
             <a:fld id="{4483B77D-A250-46E0-8E18-5D6B20B958BC}" type="datetime1">
               <a:rPr lang="en-US" smtClean="0"/>
-              <a:t>8/22/2015</a:t>
+              <a:t>8/23/2015</a:t>
             </a:fld>
             <a:endParaRPr lang="en-US" dirty="0"/>
           </a:p>
@@ -3457,7 +3457,7 @@
           <a:p>
             <a:fld id="{A4332FA6-9BA6-4B4F-AE99-90F88A80269F}" type="datetime1">
               <a:rPr lang="en-US" smtClean="0"/>
-              <a:t>8/22/2015</a:t>
+              <a:t>8/23/2015</a:t>
             </a:fld>
             <a:endParaRPr lang="en-US" dirty="0"/>
           </a:p>
@@ -3632,7 +3632,7 @@
           <a:p>
             <a:fld id="{0ED6F036-4857-477E-B0F3-EAA76BF3A87E}" type="datetime1">
               <a:rPr lang="en-US" smtClean="0"/>
-              <a:t>8/22/2015</a:t>
+              <a:t>8/23/2015</a:t>
             </a:fld>
             <a:endParaRPr lang="en-US" dirty="0"/>
           </a:p>
@@ -3883,7 +3883,7 @@
           <a:p>
             <a:fld id="{5DD13987-67D6-4BA4-BB64-1545821A185E}" type="datetime1">
               <a:rPr lang="en-US" smtClean="0"/>
-              <a:t>8/22/2015</a:t>
+              <a:t>8/23/2015</a:t>
             </a:fld>
             <a:endParaRPr lang="en-US" dirty="0"/>
           </a:p>
@@ -4058,7 +4058,7 @@
           <a:p>
             <a:fld id="{0ED6F036-4857-477E-B0F3-EAA76BF3A87E}" type="datetime1">
               <a:rPr lang="en-US" smtClean="0"/>
-              <a:t>8/22/2015</a:t>
+              <a:t>8/23/2015</a:t>
             </a:fld>
             <a:endParaRPr lang="en-US" dirty="0"/>
           </a:p>
@@ -4295,7 +4295,7 @@
           <a:p>
             <a:fld id="{95CA2143-AB3E-4E00-B751-45DFC36EE7D7}" type="datetime1">
               <a:rPr lang="en-US" smtClean="0"/>
-              <a:t>8/22/2015</a:t>
+              <a:t>8/23/2015</a:t>
             </a:fld>
             <a:endParaRPr lang="en-US" dirty="0"/>
           </a:p>
@@ -4666,7 +4666,7 @@
           <a:p>
             <a:fld id="{43D87BC1-D257-4CD1-AE6A-5EF434EDB6B6}" type="datetime1">
               <a:rPr lang="en-US" smtClean="0"/>
-              <a:t>8/22/2015</a:t>
+              <a:t>8/23/2015</a:t>
             </a:fld>
             <a:endParaRPr lang="en-US" dirty="0"/>
           </a:p>
@@ -4789,7 +4789,7 @@
           <a:p>
             <a:fld id="{FE3E20D6-77F2-4F2A-9CED-5B969CE825EE}" type="datetime1">
               <a:rPr lang="en-US" smtClean="0"/>
-              <a:t>8/22/2015</a:t>
+              <a:t>8/23/2015</a:t>
             </a:fld>
             <a:endParaRPr lang="en-US" dirty="0"/>
           </a:p>
@@ -4889,7 +4889,7 @@
           <a:p>
             <a:fld id="{B3F60B28-0126-4489-BE46-FE8F1A875EAE}" type="datetime1">
               <a:rPr lang="en-US" smtClean="0"/>
-              <a:t>8/22/2015</a:t>
+              <a:t>8/23/2015</a:t>
             </a:fld>
             <a:endParaRPr lang="en-US" dirty="0"/>
           </a:p>
@@ -5171,7 +5171,7 @@
           <a:p>
             <a:fld id="{53258F51-8563-4462-A6AE-448EB912F18A}" type="datetime1">
               <a:rPr lang="en-US" smtClean="0"/>
-              <a:t>8/22/2015</a:t>
+              <a:t>8/23/2015</a:t>
             </a:fld>
             <a:endParaRPr lang="en-US" dirty="0"/>
           </a:p>
@@ -5428,7 +5428,7 @@
           <a:p>
             <a:fld id="{F87B5513-9A19-4147-B38C-FC727D50D8AB}" type="datetime1">
               <a:rPr lang="en-US" smtClean="0"/>
-              <a:t>8/22/2015</a:t>
+              <a:t>8/23/2015</a:t>
             </a:fld>
             <a:endParaRPr lang="en-US" dirty="0"/>
           </a:p>
@@ -5603,7 +5603,7 @@
           <a:p>
             <a:fld id="{51CF433C-D46C-4579-BA0E-9196B0E6405F}" type="datetime1">
               <a:rPr lang="en-US" smtClean="0"/>
-              <a:t>8/22/2015</a:t>
+              <a:t>8/23/2015</a:t>
             </a:fld>
             <a:endParaRPr lang="en-US" dirty="0"/>
           </a:p>
@@ -5787,7 +5787,7 @@
           <a:p>
             <a:fld id="{4483B77D-A250-46E0-8E18-5D6B20B958BC}" type="datetime1">
               <a:rPr lang="en-US" smtClean="0"/>
-              <a:t>8/22/2015</a:t>
+              <a:t>8/23/2015</a:t>
             </a:fld>
             <a:endParaRPr lang="en-US" dirty="0"/>
           </a:p>
@@ -6039,7 +6039,7 @@
           <a:p>
             <a:fld id="{5DD13987-67D6-4BA4-BB64-1545821A185E}" type="datetime1">
               <a:rPr lang="en-US" smtClean="0"/>
-              <a:t>8/22/2015</a:t>
+              <a:t>8/23/2015</a:t>
             </a:fld>
             <a:endParaRPr lang="en-US" dirty="0"/>
           </a:p>
@@ -6341,7 +6341,7 @@
           <a:p>
             <a:fld id="{95CA2143-AB3E-4E00-B751-45DFC36EE7D7}" type="datetime1">
               <a:rPr lang="en-US" smtClean="0"/>
-              <a:t>8/22/2015</a:t>
+              <a:t>8/23/2015</a:t>
             </a:fld>
             <a:endParaRPr lang="en-US" dirty="0"/>
           </a:p>
@@ -6724,7 +6724,7 @@
           <a:p>
             <a:fld id="{43D87BC1-D257-4CD1-AE6A-5EF434EDB6B6}" type="datetime1">
               <a:rPr lang="en-US" smtClean="0"/>
-              <a:t>8/22/2015</a:t>
+              <a:t>8/23/2015</a:t>
             </a:fld>
             <a:endParaRPr lang="en-US" dirty="0"/>
           </a:p>
@@ -6852,7 +6852,7 @@
           <a:p>
             <a:fld id="{FE3E20D6-77F2-4F2A-9CED-5B969CE825EE}" type="datetime1">
               <a:rPr lang="en-US" smtClean="0"/>
-              <a:t>8/22/2015</a:t>
+              <a:t>8/23/2015</a:t>
             </a:fld>
             <a:endParaRPr lang="en-US" dirty="0"/>
           </a:p>
@@ -6952,7 +6952,7 @@
           <a:p>
             <a:fld id="{B3F60B28-0126-4489-BE46-FE8F1A875EAE}" type="datetime1">
               <a:rPr lang="en-US" smtClean="0"/>
-              <a:t>8/22/2015</a:t>
+              <a:t>8/23/2015</a:t>
             </a:fld>
             <a:endParaRPr lang="en-US" dirty="0"/>
           </a:p>
@@ -7212,7 +7212,7 @@
           <a:p>
             <a:fld id="{53258F51-8563-4462-A6AE-448EB912F18A}" type="datetime1">
               <a:rPr lang="en-US" smtClean="0"/>
-              <a:t>8/22/2015</a:t>
+              <a:t>8/23/2015</a:t>
             </a:fld>
             <a:endParaRPr lang="en-US" dirty="0"/>
           </a:p>
@@ -7479,7 +7479,7 @@
           <a:p>
             <a:fld id="{F87B5513-9A19-4147-B38C-FC727D50D8AB}" type="datetime1">
               <a:rPr lang="en-US" smtClean="0"/>
-              <a:t>8/22/2015</a:t>
+              <a:t>8/23/2015</a:t>
             </a:fld>
             <a:endParaRPr lang="en-US" dirty="0"/>
           </a:p>
@@ -8298,7 +8298,7 @@
           <a:p>
             <a:fld id="{ACDB6D9D-800F-49BB-8FF9-94A9F32541C8}" type="datetime1">
               <a:rPr lang="en-US" smtClean="0"/>
-              <a:t>8/22/2015</a:t>
+              <a:t>8/23/2015</a:t>
             </a:fld>
             <a:endParaRPr lang="en-US" dirty="0"/>
           </a:p>
@@ -8963,7 +8963,7 @@
           <a:p>
             <a:fld id="{ACDB6D9D-800F-49BB-8FF9-94A9F32541C8}" type="datetime1">
               <a:rPr lang="en-US" smtClean="0"/>
-              <a:t>8/22/2015</a:t>
+              <a:t>8/23/2015</a:t>
             </a:fld>
             <a:endParaRPr lang="en-US" dirty="0"/>
           </a:p>
@@ -9913,7 +9913,7 @@
       </p:sp>
       <p:sp>
         <p:nvSpPr>
-          <p:cNvPr id="13" name="Rectangle 12"/>
+          <p:cNvPr id="17" name="Rectangle 16"/>
           <p:cNvSpPr/>
           <p:nvPr/>
         </p:nvSpPr>
@@ -9951,13 +9951,13 @@
       </p:sp>
       <p:sp>
         <p:nvSpPr>
-          <p:cNvPr id="14" name="Rectangle 13"/>
+          <p:cNvPr id="18" name="Rectangle 17"/>
           <p:cNvSpPr/>
           <p:nvPr/>
         </p:nvSpPr>
         <p:spPr>
           <a:xfrm>
-            <a:off x="4535658" y="1235255"/>
+            <a:off x="4121141" y="3186553"/>
             <a:ext cx="124691" cy="124691"/>
           </a:xfrm>
           <a:prstGeom prst="rect">
@@ -9996,13 +9996,13 @@
       </p:sp>
       <p:sp>
         <p:nvSpPr>
-          <p:cNvPr id="15" name="Rectangle 14"/>
+          <p:cNvPr id="19" name="Rectangle 18"/>
           <p:cNvSpPr/>
           <p:nvPr/>
         </p:nvSpPr>
         <p:spPr>
           <a:xfrm>
-            <a:off x="4653422" y="1623182"/>
+            <a:off x="4482880" y="3157758"/>
             <a:ext cx="124691" cy="124691"/>
           </a:xfrm>
           <a:prstGeom prst="rect">
@@ -10041,13 +10041,13 @@
       </p:sp>
       <p:sp>
         <p:nvSpPr>
-          <p:cNvPr id="16" name="Rectangle 15"/>
+          <p:cNvPr id="20" name="Rectangle 19"/>
           <p:cNvSpPr/>
           <p:nvPr/>
         </p:nvSpPr>
         <p:spPr>
           <a:xfrm>
-            <a:off x="5179894" y="1359946"/>
+            <a:off x="4268135" y="2662272"/>
             <a:ext cx="124691" cy="124691"/>
           </a:xfrm>
           <a:prstGeom prst="rect">
@@ -10086,13 +10086,13 @@
       </p:sp>
       <p:sp>
         <p:nvSpPr>
-          <p:cNvPr id="21" name="Rectangle 20"/>
+          <p:cNvPr id="29" name="Rectangle 28"/>
           <p:cNvSpPr/>
           <p:nvPr/>
         </p:nvSpPr>
         <p:spPr>
           <a:xfrm>
-            <a:off x="6696967" y="1685527"/>
+            <a:off x="6136061" y="2786963"/>
             <a:ext cx="124691" cy="124691"/>
           </a:xfrm>
           <a:prstGeom prst="rect">
@@ -10131,13 +10131,13 @@
       </p:sp>
       <p:sp>
         <p:nvSpPr>
-          <p:cNvPr id="22" name="Rectangle 21"/>
+          <p:cNvPr id="30" name="Rectangle 29"/>
           <p:cNvSpPr/>
           <p:nvPr/>
         </p:nvSpPr>
         <p:spPr>
           <a:xfrm>
-            <a:off x="6572276" y="2218927"/>
+            <a:off x="6624178" y="2482829"/>
             <a:ext cx="124691" cy="124691"/>
           </a:xfrm>
           <a:prstGeom prst="rect">
@@ -10176,13 +10176,13 @@
       </p:sp>
       <p:sp>
         <p:nvSpPr>
-          <p:cNvPr id="23" name="Rectangle 22"/>
+          <p:cNvPr id="31" name="Rectangle 30"/>
           <p:cNvSpPr/>
           <p:nvPr/>
         </p:nvSpPr>
         <p:spPr>
           <a:xfrm>
-            <a:off x="7098749" y="2156581"/>
+            <a:off x="7134445" y="2461539"/>
             <a:ext cx="124691" cy="124691"/>
           </a:xfrm>
           <a:prstGeom prst="rect">
@@ -10221,13 +10221,13 @@
       </p:sp>
       <p:sp>
         <p:nvSpPr>
-          <p:cNvPr id="24" name="Rectangle 23"/>
+          <p:cNvPr id="32" name="Rectangle 31"/>
           <p:cNvSpPr/>
           <p:nvPr/>
         </p:nvSpPr>
         <p:spPr>
           <a:xfrm>
-            <a:off x="6960204" y="2859700"/>
+            <a:off x="7072100" y="3080160"/>
             <a:ext cx="124691" cy="124691"/>
           </a:xfrm>
           <a:prstGeom prst="rect">
@@ -10266,13 +10266,13 @@
       </p:sp>
       <p:sp>
         <p:nvSpPr>
-          <p:cNvPr id="25" name="Rectangle 24"/>
+          <p:cNvPr id="33" name="Rectangle 32"/>
           <p:cNvSpPr/>
           <p:nvPr/>
         </p:nvSpPr>
         <p:spPr>
           <a:xfrm>
-            <a:off x="5179894" y="2599927"/>
+            <a:off x="5840142" y="1021001"/>
             <a:ext cx="124691" cy="124691"/>
           </a:xfrm>
           <a:prstGeom prst="rect">
@@ -10311,13 +10311,13 @@
       </p:sp>
       <p:sp>
         <p:nvSpPr>
-          <p:cNvPr id="26" name="Rectangle 25"/>
+          <p:cNvPr id="34" name="Rectangle 33"/>
           <p:cNvSpPr/>
           <p:nvPr/>
         </p:nvSpPr>
         <p:spPr>
           <a:xfrm>
-            <a:off x="4778113" y="2970537"/>
+            <a:off x="5438361" y="1391611"/>
             <a:ext cx="124691" cy="124691"/>
           </a:xfrm>
           <a:prstGeom prst="rect">
@@ -10356,13 +10356,13 @@
       </p:sp>
       <p:sp>
         <p:nvSpPr>
-          <p:cNvPr id="27" name="Rectangle 26"/>
+          <p:cNvPr id="35" name="Rectangle 34"/>
           <p:cNvSpPr/>
           <p:nvPr/>
         </p:nvSpPr>
         <p:spPr>
           <a:xfrm>
-            <a:off x="5433979" y="3136792"/>
+            <a:off x="6094227" y="1557866"/>
             <a:ext cx="124691" cy="124691"/>
           </a:xfrm>
           <a:prstGeom prst="rect">
@@ -10401,13 +10401,13 @@
       </p:sp>
       <p:sp>
         <p:nvSpPr>
-          <p:cNvPr id="28" name="Rectangle 27"/>
+          <p:cNvPr id="36" name="Rectangle 35"/>
           <p:cNvSpPr/>
           <p:nvPr/>
         </p:nvSpPr>
         <p:spPr>
           <a:xfrm>
-            <a:off x="4715767" y="3405223"/>
+            <a:off x="5376015" y="1826297"/>
             <a:ext cx="124691" cy="124691"/>
           </a:xfrm>
           <a:prstGeom prst="rect">
@@ -12580,7 +12580,7 @@
         </p:nvSpPr>
         <p:spPr>
           <a:xfrm>
-            <a:off x="4535658" y="1235255"/>
+            <a:off x="4121141" y="3186553"/>
             <a:ext cx="124691" cy="124691"/>
           </a:xfrm>
           <a:prstGeom prst="rect">
@@ -12625,7 +12625,7 @@
         </p:nvSpPr>
         <p:spPr>
           <a:xfrm>
-            <a:off x="4653422" y="1623182"/>
+            <a:off x="4482880" y="3157758"/>
             <a:ext cx="124691" cy="124691"/>
           </a:xfrm>
           <a:prstGeom prst="rect">
@@ -12670,7 +12670,7 @@
         </p:nvSpPr>
         <p:spPr>
           <a:xfrm>
-            <a:off x="5179894" y="1359946"/>
+            <a:off x="4268135" y="2662272"/>
             <a:ext cx="124691" cy="124691"/>
           </a:xfrm>
           <a:prstGeom prst="rect">
@@ -12715,7 +12715,7 @@
         </p:nvSpPr>
         <p:spPr>
           <a:xfrm>
-            <a:off x="6696967" y="1685527"/>
+            <a:off x="6136061" y="2786963"/>
             <a:ext cx="124691" cy="124691"/>
           </a:xfrm>
           <a:prstGeom prst="rect">
@@ -12760,7 +12760,7 @@
         </p:nvSpPr>
         <p:spPr>
           <a:xfrm>
-            <a:off x="6572276" y="2218927"/>
+            <a:off x="6624178" y="2482829"/>
             <a:ext cx="124691" cy="124691"/>
           </a:xfrm>
           <a:prstGeom prst="rect">
@@ -12805,7 +12805,7 @@
         </p:nvSpPr>
         <p:spPr>
           <a:xfrm>
-            <a:off x="7098749" y="2156581"/>
+            <a:off x="7134445" y="2461539"/>
             <a:ext cx="124691" cy="124691"/>
           </a:xfrm>
           <a:prstGeom prst="rect">
@@ -12850,7 +12850,7 @@
         </p:nvSpPr>
         <p:spPr>
           <a:xfrm>
-            <a:off x="6960204" y="2859700"/>
+            <a:off x="7072100" y="3080160"/>
             <a:ext cx="124691" cy="124691"/>
           </a:xfrm>
           <a:prstGeom prst="rect">
@@ -12895,7 +12895,7 @@
         </p:nvSpPr>
         <p:spPr>
           <a:xfrm>
-            <a:off x="5179894" y="2599927"/>
+            <a:off x="5840142" y="1021001"/>
             <a:ext cx="124691" cy="124691"/>
           </a:xfrm>
           <a:prstGeom prst="rect">
@@ -12940,7 +12940,7 @@
         </p:nvSpPr>
         <p:spPr>
           <a:xfrm>
-            <a:off x="4778113" y="2970537"/>
+            <a:off x="5438361" y="1391611"/>
             <a:ext cx="124691" cy="124691"/>
           </a:xfrm>
           <a:prstGeom prst="rect">
@@ -12985,7 +12985,7 @@
         </p:nvSpPr>
         <p:spPr>
           <a:xfrm>
-            <a:off x="5433979" y="3136792"/>
+            <a:off x="6094227" y="1557866"/>
             <a:ext cx="124691" cy="124691"/>
           </a:xfrm>
           <a:prstGeom prst="rect">
@@ -13030,7 +13030,7 @@
         </p:nvSpPr>
         <p:spPr>
           <a:xfrm>
-            <a:off x="4715767" y="3405223"/>
+            <a:off x="5376015" y="1826297"/>
             <a:ext cx="124691" cy="124691"/>
           </a:xfrm>
           <a:prstGeom prst="rect">
@@ -13075,7 +13075,7 @@
         </p:nvSpPr>
         <p:spPr>
           <a:xfrm>
-            <a:off x="5558670" y="1422291"/>
+            <a:off x="5088632" y="2867192"/>
             <a:ext cx="140770" cy="140770"/>
           </a:xfrm>
           <a:prstGeom prst="ellipse">
@@ -13115,7 +13115,7 @@
         </p:nvSpPr>
         <p:spPr>
           <a:xfrm>
-            <a:off x="4832419" y="2570486"/>
+            <a:off x="5547883" y="1996719"/>
             <a:ext cx="140770" cy="140770"/>
           </a:xfrm>
           <a:prstGeom prst="ellipse">
@@ -13158,7 +13158,7 @@
         </p:nvSpPr>
         <p:spPr>
           <a:xfrm>
-            <a:off x="6485942" y="2726683"/>
+            <a:off x="6700995" y="2290380"/>
             <a:ext cx="140770" cy="140770"/>
           </a:xfrm>
           <a:prstGeom prst="ellipse">
@@ -13204,8 +13204,8 @@
         </p:nvCxnSpPr>
         <p:spPr>
           <a:xfrm flipV="1">
-            <a:off x="4778113" y="1492676"/>
-            <a:ext cx="780557" cy="192852"/>
+            <a:off x="4607571" y="2937577"/>
+            <a:ext cx="481061" cy="282527"/>
           </a:xfrm>
           <a:prstGeom prst="line">
             <a:avLst/>
@@ -13230,15 +13230,15 @@
         <p:nvCxnSpPr>
           <p:cNvPr id="44" name="Straight Connector 43"/>
           <p:cNvCxnSpPr>
-            <a:stCxn id="30" idx="2"/>
-            <a:endCxn id="41" idx="0"/>
+            <a:stCxn id="30" idx="3"/>
+            <a:endCxn id="41" idx="4"/>
           </p:cNvCxnSpPr>
           <p:nvPr/>
         </p:nvCxnSpPr>
         <p:spPr>
-          <a:xfrm>
-            <a:off x="4715768" y="1747873"/>
-            <a:ext cx="187036" cy="822613"/>
+          <a:xfrm flipV="1">
+            <a:off x="4607571" y="2137489"/>
+            <a:ext cx="1010697" cy="1082615"/>
           </a:xfrm>
           <a:prstGeom prst="line">
             <a:avLst/>
@@ -13263,14 +13263,15 @@
         <p:nvCxnSpPr>
           <p:cNvPr id="45" name="Straight Connector 44"/>
           <p:cNvCxnSpPr>
-            <a:endCxn id="42" idx="1"/>
+            <a:stCxn id="30" idx="3"/>
+            <a:endCxn id="42" idx="2"/>
           </p:cNvCxnSpPr>
           <p:nvPr/>
         </p:nvCxnSpPr>
         <p:spPr>
-          <a:xfrm>
-            <a:off x="4778113" y="1747873"/>
-            <a:ext cx="1728444" cy="999425"/>
+          <a:xfrm flipV="1">
+            <a:off x="4607571" y="2360765"/>
+            <a:ext cx="2093424" cy="859339"/>
           </a:xfrm>
           <a:prstGeom prst="line">
             <a:avLst/>
@@ -13299,7 +13300,7 @@
         </p:nvSpPr>
         <p:spPr>
           <a:xfrm>
-            <a:off x="4815616" y="1411351"/>
+            <a:off x="4306770" y="2939390"/>
             <a:ext cx="140770" cy="140770"/>
           </a:xfrm>
           <a:prstGeom prst="ellipse">
@@ -13339,7 +13340,7 @@
         </p:nvSpPr>
         <p:spPr>
           <a:xfrm>
-            <a:off x="6843061" y="2251281"/>
+            <a:off x="6694202" y="2867453"/>
             <a:ext cx="140770" cy="140770"/>
           </a:xfrm>
           <a:prstGeom prst="ellipse">
@@ -13382,7 +13383,7 @@
         </p:nvSpPr>
         <p:spPr>
           <a:xfrm>
-            <a:off x="5094002" y="3064081"/>
+            <a:off x="5774443" y="1399881"/>
             <a:ext cx="140770" cy="140770"/>
           </a:xfrm>
           <a:prstGeom prst="ellipse">
@@ -15888,517 +15889,6 @@
       </p:sp>
       <p:sp>
         <p:nvSpPr>
-          <p:cNvPr id="6" name="Rectangle 5"/>
-          <p:cNvSpPr/>
-          <p:nvPr/>
-        </p:nvSpPr>
-        <p:spPr>
-          <a:xfrm>
-            <a:off x="4728124" y="644340"/>
-            <a:ext cx="3916390" cy="3040555"/>
-          </a:xfrm>
-          <a:prstGeom prst="rect">
-            <a:avLst/>
-          </a:prstGeom>
-        </p:spPr>
-        <p:style>
-          <a:lnRef idx="2">
-            <a:schemeClr val="accent6"/>
-          </a:lnRef>
-          <a:fillRef idx="1">
-            <a:schemeClr val="lt1"/>
-          </a:fillRef>
-          <a:effectRef idx="0">
-            <a:schemeClr val="accent6"/>
-          </a:effectRef>
-          <a:fontRef idx="minor">
-            <a:schemeClr val="dk1"/>
-          </a:fontRef>
-        </p:style>
-        <p:txBody>
-          <a:bodyPr rtlCol="0" anchor="ctr"/>
-          <a:lstStyle/>
-          <a:p>
-            <a:pPr algn="ctr"/>
-            <a:endParaRPr lang="en-US"/>
-          </a:p>
-        </p:txBody>
-      </p:sp>
-      <p:sp>
-        <p:nvSpPr>
-          <p:cNvPr id="7" name="Rectangle 6"/>
-          <p:cNvSpPr/>
-          <p:nvPr/>
-        </p:nvSpPr>
-        <p:spPr>
-          <a:xfrm>
-            <a:off x="5310014" y="1032267"/>
-            <a:ext cx="124691" cy="124691"/>
-          </a:xfrm>
-          <a:prstGeom prst="rect">
-            <a:avLst/>
-          </a:prstGeom>
-          <a:solidFill>
-            <a:schemeClr val="accent1"/>
-          </a:solidFill>
-        </p:spPr>
-        <p:style>
-          <a:lnRef idx="2">
-            <a:schemeClr val="accent1">
-              <a:shade val="50000"/>
-            </a:schemeClr>
-          </a:lnRef>
-          <a:fillRef idx="1">
-            <a:schemeClr val="accent1"/>
-          </a:fillRef>
-          <a:effectRef idx="0">
-            <a:schemeClr val="accent1"/>
-          </a:effectRef>
-          <a:fontRef idx="minor">
-            <a:schemeClr val="lt1"/>
-          </a:fontRef>
-        </p:style>
-        <p:txBody>
-          <a:bodyPr rtlCol="0" anchor="ctr"/>
-          <a:lstStyle/>
-          <a:p>
-            <a:pPr algn="ctr"/>
-            <a:endParaRPr lang="en-US"/>
-          </a:p>
-        </p:txBody>
-      </p:sp>
-      <p:sp>
-        <p:nvSpPr>
-          <p:cNvPr id="8" name="Rectangle 7"/>
-          <p:cNvSpPr/>
-          <p:nvPr/>
-        </p:nvSpPr>
-        <p:spPr>
-          <a:xfrm>
-            <a:off x="5427778" y="1420194"/>
-            <a:ext cx="124691" cy="124691"/>
-          </a:xfrm>
-          <a:prstGeom prst="rect">
-            <a:avLst/>
-          </a:prstGeom>
-          <a:solidFill>
-            <a:schemeClr val="accent1"/>
-          </a:solidFill>
-        </p:spPr>
-        <p:style>
-          <a:lnRef idx="2">
-            <a:schemeClr val="accent1">
-              <a:shade val="50000"/>
-            </a:schemeClr>
-          </a:lnRef>
-          <a:fillRef idx="1">
-            <a:schemeClr val="accent1"/>
-          </a:fillRef>
-          <a:effectRef idx="0">
-            <a:schemeClr val="accent1"/>
-          </a:effectRef>
-          <a:fontRef idx="minor">
-            <a:schemeClr val="lt1"/>
-          </a:fontRef>
-        </p:style>
-        <p:txBody>
-          <a:bodyPr rtlCol="0" anchor="ctr"/>
-          <a:lstStyle/>
-          <a:p>
-            <a:pPr algn="ctr"/>
-            <a:endParaRPr lang="en-US"/>
-          </a:p>
-        </p:txBody>
-      </p:sp>
-      <p:sp>
-        <p:nvSpPr>
-          <p:cNvPr id="9" name="Rectangle 8"/>
-          <p:cNvSpPr/>
-          <p:nvPr/>
-        </p:nvSpPr>
-        <p:spPr>
-          <a:xfrm>
-            <a:off x="5954250" y="1156958"/>
-            <a:ext cx="124691" cy="124691"/>
-          </a:xfrm>
-          <a:prstGeom prst="rect">
-            <a:avLst/>
-          </a:prstGeom>
-          <a:solidFill>
-            <a:schemeClr val="accent1"/>
-          </a:solidFill>
-        </p:spPr>
-        <p:style>
-          <a:lnRef idx="2">
-            <a:schemeClr val="accent1">
-              <a:shade val="50000"/>
-            </a:schemeClr>
-          </a:lnRef>
-          <a:fillRef idx="1">
-            <a:schemeClr val="accent1"/>
-          </a:fillRef>
-          <a:effectRef idx="0">
-            <a:schemeClr val="accent1"/>
-          </a:effectRef>
-          <a:fontRef idx="minor">
-            <a:schemeClr val="lt1"/>
-          </a:fontRef>
-        </p:style>
-        <p:txBody>
-          <a:bodyPr rtlCol="0" anchor="ctr"/>
-          <a:lstStyle/>
-          <a:p>
-            <a:pPr algn="ctr"/>
-            <a:endParaRPr lang="en-US"/>
-          </a:p>
-        </p:txBody>
-      </p:sp>
-      <p:sp>
-        <p:nvSpPr>
-          <p:cNvPr id="10" name="Rectangle 9"/>
-          <p:cNvSpPr/>
-          <p:nvPr/>
-        </p:nvSpPr>
-        <p:spPr>
-          <a:xfrm>
-            <a:off x="7471323" y="1482539"/>
-            <a:ext cx="124691" cy="124691"/>
-          </a:xfrm>
-          <a:prstGeom prst="rect">
-            <a:avLst/>
-          </a:prstGeom>
-          <a:solidFill>
-            <a:srgbClr val="00B0F0"/>
-          </a:solidFill>
-        </p:spPr>
-        <p:style>
-          <a:lnRef idx="2">
-            <a:schemeClr val="accent1">
-              <a:shade val="50000"/>
-            </a:schemeClr>
-          </a:lnRef>
-          <a:fillRef idx="1">
-            <a:schemeClr val="accent1"/>
-          </a:fillRef>
-          <a:effectRef idx="0">
-            <a:schemeClr val="accent1"/>
-          </a:effectRef>
-          <a:fontRef idx="minor">
-            <a:schemeClr val="lt1"/>
-          </a:fontRef>
-        </p:style>
-        <p:txBody>
-          <a:bodyPr rtlCol="0" anchor="ctr"/>
-          <a:lstStyle/>
-          <a:p>
-            <a:pPr algn="ctr"/>
-            <a:endParaRPr lang="en-US"/>
-          </a:p>
-        </p:txBody>
-      </p:sp>
-      <p:sp>
-        <p:nvSpPr>
-          <p:cNvPr id="11" name="Rectangle 10"/>
-          <p:cNvSpPr/>
-          <p:nvPr/>
-        </p:nvSpPr>
-        <p:spPr>
-          <a:xfrm>
-            <a:off x="7346632" y="2015939"/>
-            <a:ext cx="124691" cy="124691"/>
-          </a:xfrm>
-          <a:prstGeom prst="rect">
-            <a:avLst/>
-          </a:prstGeom>
-          <a:solidFill>
-            <a:srgbClr val="00B0F0"/>
-          </a:solidFill>
-        </p:spPr>
-        <p:style>
-          <a:lnRef idx="2">
-            <a:schemeClr val="accent1">
-              <a:shade val="50000"/>
-            </a:schemeClr>
-          </a:lnRef>
-          <a:fillRef idx="1">
-            <a:schemeClr val="accent1"/>
-          </a:fillRef>
-          <a:effectRef idx="0">
-            <a:schemeClr val="accent1"/>
-          </a:effectRef>
-          <a:fontRef idx="minor">
-            <a:schemeClr val="lt1"/>
-          </a:fontRef>
-        </p:style>
-        <p:txBody>
-          <a:bodyPr rtlCol="0" anchor="ctr"/>
-          <a:lstStyle/>
-          <a:p>
-            <a:pPr algn="ctr"/>
-            <a:endParaRPr lang="en-US"/>
-          </a:p>
-        </p:txBody>
-      </p:sp>
-      <p:sp>
-        <p:nvSpPr>
-          <p:cNvPr id="12" name="Rectangle 11"/>
-          <p:cNvSpPr/>
-          <p:nvPr/>
-        </p:nvSpPr>
-        <p:spPr>
-          <a:xfrm>
-            <a:off x="7873105" y="1953593"/>
-            <a:ext cx="124691" cy="124691"/>
-          </a:xfrm>
-          <a:prstGeom prst="rect">
-            <a:avLst/>
-          </a:prstGeom>
-          <a:solidFill>
-            <a:srgbClr val="00B0F0"/>
-          </a:solidFill>
-        </p:spPr>
-        <p:style>
-          <a:lnRef idx="2">
-            <a:schemeClr val="accent1">
-              <a:shade val="50000"/>
-            </a:schemeClr>
-          </a:lnRef>
-          <a:fillRef idx="1">
-            <a:schemeClr val="accent1"/>
-          </a:fillRef>
-          <a:effectRef idx="0">
-            <a:schemeClr val="accent1"/>
-          </a:effectRef>
-          <a:fontRef idx="minor">
-            <a:schemeClr val="lt1"/>
-          </a:fontRef>
-        </p:style>
-        <p:txBody>
-          <a:bodyPr rtlCol="0" anchor="ctr"/>
-          <a:lstStyle/>
-          <a:p>
-            <a:pPr algn="ctr"/>
-            <a:endParaRPr lang="en-US"/>
-          </a:p>
-        </p:txBody>
-      </p:sp>
-      <p:sp>
-        <p:nvSpPr>
-          <p:cNvPr id="13" name="Rectangle 12"/>
-          <p:cNvSpPr/>
-          <p:nvPr/>
-        </p:nvSpPr>
-        <p:spPr>
-          <a:xfrm>
-            <a:off x="7734560" y="2656712"/>
-            <a:ext cx="124691" cy="124691"/>
-          </a:xfrm>
-          <a:prstGeom prst="rect">
-            <a:avLst/>
-          </a:prstGeom>
-          <a:solidFill>
-            <a:srgbClr val="00B0F0"/>
-          </a:solidFill>
-        </p:spPr>
-        <p:style>
-          <a:lnRef idx="2">
-            <a:schemeClr val="accent1">
-              <a:shade val="50000"/>
-            </a:schemeClr>
-          </a:lnRef>
-          <a:fillRef idx="1">
-            <a:schemeClr val="accent1"/>
-          </a:fillRef>
-          <a:effectRef idx="0">
-            <a:schemeClr val="accent1"/>
-          </a:effectRef>
-          <a:fontRef idx="minor">
-            <a:schemeClr val="lt1"/>
-          </a:fontRef>
-        </p:style>
-        <p:txBody>
-          <a:bodyPr rtlCol="0" anchor="ctr"/>
-          <a:lstStyle/>
-          <a:p>
-            <a:pPr algn="ctr"/>
-            <a:endParaRPr lang="en-US"/>
-          </a:p>
-        </p:txBody>
-      </p:sp>
-      <p:sp>
-        <p:nvSpPr>
-          <p:cNvPr id="14" name="Rectangle 13"/>
-          <p:cNvSpPr/>
-          <p:nvPr/>
-        </p:nvSpPr>
-        <p:spPr>
-          <a:xfrm>
-            <a:off x="5954250" y="2396939"/>
-            <a:ext cx="124691" cy="124691"/>
-          </a:xfrm>
-          <a:prstGeom prst="rect">
-            <a:avLst/>
-          </a:prstGeom>
-          <a:solidFill>
-            <a:srgbClr val="FFC000"/>
-          </a:solidFill>
-        </p:spPr>
-        <p:style>
-          <a:lnRef idx="2">
-            <a:schemeClr val="accent1">
-              <a:shade val="50000"/>
-            </a:schemeClr>
-          </a:lnRef>
-          <a:fillRef idx="1">
-            <a:schemeClr val="accent1"/>
-          </a:fillRef>
-          <a:effectRef idx="0">
-            <a:schemeClr val="accent1"/>
-          </a:effectRef>
-          <a:fontRef idx="minor">
-            <a:schemeClr val="lt1"/>
-          </a:fontRef>
-        </p:style>
-        <p:txBody>
-          <a:bodyPr rtlCol="0" anchor="ctr"/>
-          <a:lstStyle/>
-          <a:p>
-            <a:pPr algn="ctr"/>
-            <a:endParaRPr lang="en-US"/>
-          </a:p>
-        </p:txBody>
-      </p:sp>
-      <p:sp>
-        <p:nvSpPr>
-          <p:cNvPr id="15" name="Rectangle 14"/>
-          <p:cNvSpPr/>
-          <p:nvPr/>
-        </p:nvSpPr>
-        <p:spPr>
-          <a:xfrm>
-            <a:off x="5552469" y="2767549"/>
-            <a:ext cx="124691" cy="124691"/>
-          </a:xfrm>
-          <a:prstGeom prst="rect">
-            <a:avLst/>
-          </a:prstGeom>
-          <a:solidFill>
-            <a:srgbClr val="FFC000"/>
-          </a:solidFill>
-        </p:spPr>
-        <p:style>
-          <a:lnRef idx="2">
-            <a:schemeClr val="accent1">
-              <a:shade val="50000"/>
-            </a:schemeClr>
-          </a:lnRef>
-          <a:fillRef idx="1">
-            <a:schemeClr val="accent1"/>
-          </a:fillRef>
-          <a:effectRef idx="0">
-            <a:schemeClr val="accent1"/>
-          </a:effectRef>
-          <a:fontRef idx="minor">
-            <a:schemeClr val="lt1"/>
-          </a:fontRef>
-        </p:style>
-        <p:txBody>
-          <a:bodyPr rtlCol="0" anchor="ctr"/>
-          <a:lstStyle/>
-          <a:p>
-            <a:pPr algn="ctr"/>
-            <a:endParaRPr lang="en-US"/>
-          </a:p>
-        </p:txBody>
-      </p:sp>
-      <p:sp>
-        <p:nvSpPr>
-          <p:cNvPr id="17" name="Rectangle 16"/>
-          <p:cNvSpPr/>
-          <p:nvPr/>
-        </p:nvSpPr>
-        <p:spPr>
-          <a:xfrm>
-            <a:off x="6208335" y="2933804"/>
-            <a:ext cx="124691" cy="124691"/>
-          </a:xfrm>
-          <a:prstGeom prst="rect">
-            <a:avLst/>
-          </a:prstGeom>
-          <a:solidFill>
-            <a:srgbClr val="FFC000"/>
-          </a:solidFill>
-        </p:spPr>
-        <p:style>
-          <a:lnRef idx="2">
-            <a:schemeClr val="accent1">
-              <a:shade val="50000"/>
-            </a:schemeClr>
-          </a:lnRef>
-          <a:fillRef idx="1">
-            <a:schemeClr val="accent1"/>
-          </a:fillRef>
-          <a:effectRef idx="0">
-            <a:schemeClr val="accent1"/>
-          </a:effectRef>
-          <a:fontRef idx="minor">
-            <a:schemeClr val="lt1"/>
-          </a:fontRef>
-        </p:style>
-        <p:txBody>
-          <a:bodyPr rtlCol="0" anchor="ctr"/>
-          <a:lstStyle/>
-          <a:p>
-            <a:pPr algn="ctr"/>
-            <a:endParaRPr lang="en-US"/>
-          </a:p>
-        </p:txBody>
-      </p:sp>
-      <p:sp>
-        <p:nvSpPr>
-          <p:cNvPr id="18" name="Rectangle 17"/>
-          <p:cNvSpPr/>
-          <p:nvPr/>
-        </p:nvSpPr>
-        <p:spPr>
-          <a:xfrm>
-            <a:off x="5490123" y="3202235"/>
-            <a:ext cx="124691" cy="124691"/>
-          </a:xfrm>
-          <a:prstGeom prst="rect">
-            <a:avLst/>
-          </a:prstGeom>
-          <a:solidFill>
-            <a:srgbClr val="FFC000"/>
-          </a:solidFill>
-        </p:spPr>
-        <p:style>
-          <a:lnRef idx="2">
-            <a:schemeClr val="accent1">
-              <a:shade val="50000"/>
-            </a:schemeClr>
-          </a:lnRef>
-          <a:fillRef idx="1">
-            <a:schemeClr val="accent1"/>
-          </a:fillRef>
-          <a:effectRef idx="0">
-            <a:schemeClr val="accent1"/>
-          </a:effectRef>
-          <a:fontRef idx="minor">
-            <a:schemeClr val="lt1"/>
-          </a:fontRef>
-        </p:style>
-        <p:txBody>
-          <a:bodyPr rtlCol="0" anchor="ctr"/>
-          <a:lstStyle/>
-          <a:p>
-            <a:pPr algn="ctr"/>
-            <a:endParaRPr lang="en-US"/>
-          </a:p>
-        </p:txBody>
-      </p:sp>
-      <p:sp>
-        <p:nvSpPr>
           <p:cNvPr id="33" name="Title 5"/>
           <p:cNvSpPr>
             <a:spLocks noGrp="1"/>
@@ -16422,49 +15912,6 @@
               <a:t>KNN Algorithm</a:t>
             </a:r>
             <a:endParaRPr lang="en-US" dirty="0"/>
-          </a:p>
-        </p:txBody>
-      </p:sp>
-      <p:sp>
-        <p:nvSpPr>
-          <p:cNvPr id="34" name="Oval 33"/>
-          <p:cNvSpPr/>
-          <p:nvPr/>
-        </p:nvSpPr>
-        <p:spPr>
-          <a:xfrm>
-            <a:off x="7268207" y="3019981"/>
-            <a:ext cx="140770" cy="140770"/>
-          </a:xfrm>
-          <a:prstGeom prst="ellipse">
-            <a:avLst/>
-          </a:prstGeom>
-          <a:solidFill>
-            <a:srgbClr val="7030A0"/>
-          </a:solidFill>
-        </p:spPr>
-        <p:style>
-          <a:lnRef idx="2">
-            <a:schemeClr val="accent1">
-              <a:shade val="50000"/>
-            </a:schemeClr>
-          </a:lnRef>
-          <a:fillRef idx="1">
-            <a:schemeClr val="accent1"/>
-          </a:fillRef>
-          <a:effectRef idx="0">
-            <a:schemeClr val="accent1"/>
-          </a:effectRef>
-          <a:fontRef idx="minor">
-            <a:schemeClr val="lt1"/>
-          </a:fontRef>
-        </p:style>
-        <p:txBody>
-          <a:bodyPr rtlCol="0" anchor="ctr"/>
-          <a:lstStyle/>
-          <a:p>
-            <a:pPr algn="ctr"/>
-            <a:endParaRPr lang="en-US"/>
           </a:p>
         </p:txBody>
       </p:sp>
@@ -16948,72 +16395,6 @@
           </p:sp>
         </mc:Fallback>
       </mc:AlternateContent>
-      <p:cxnSp>
-        <p:nvCxnSpPr>
-          <p:cNvPr id="46" name="Straight Connector 45"/>
-          <p:cNvCxnSpPr>
-            <a:stCxn id="34" idx="5"/>
-            <a:endCxn id="13" idx="1"/>
-          </p:cNvCxnSpPr>
-          <p:nvPr/>
-        </p:nvCxnSpPr>
-        <p:spPr>
-          <a:xfrm flipV="1">
-            <a:off x="7388362" y="2719058"/>
-            <a:ext cx="346198" cy="421078"/>
-          </a:xfrm>
-          <a:prstGeom prst="line">
-            <a:avLst/>
-          </a:prstGeom>
-        </p:spPr>
-        <p:style>
-          <a:lnRef idx="1">
-            <a:schemeClr val="accent1"/>
-          </a:lnRef>
-          <a:fillRef idx="0">
-            <a:schemeClr val="accent1"/>
-          </a:fillRef>
-          <a:effectRef idx="0">
-            <a:schemeClr val="accent1"/>
-          </a:effectRef>
-          <a:fontRef idx="minor">
-            <a:schemeClr val="tx1"/>
-          </a:fontRef>
-        </p:style>
-      </p:cxnSp>
-      <p:cxnSp>
-        <p:nvCxnSpPr>
-          <p:cNvPr id="48" name="Straight Connector 47"/>
-          <p:cNvCxnSpPr>
-            <a:stCxn id="34" idx="2"/>
-            <a:endCxn id="17" idx="3"/>
-          </p:cNvCxnSpPr>
-          <p:nvPr/>
-        </p:nvCxnSpPr>
-        <p:spPr>
-          <a:xfrm flipH="1" flipV="1">
-            <a:off x="6333026" y="2996150"/>
-            <a:ext cx="935181" cy="94216"/>
-          </a:xfrm>
-          <a:prstGeom prst="line">
-            <a:avLst/>
-          </a:prstGeom>
-        </p:spPr>
-        <p:style>
-          <a:lnRef idx="1">
-            <a:schemeClr val="accent1"/>
-          </a:lnRef>
-          <a:fillRef idx="0">
-            <a:schemeClr val="accent1"/>
-          </a:fillRef>
-          <a:effectRef idx="0">
-            <a:schemeClr val="accent1"/>
-          </a:effectRef>
-          <a:fontRef idx="minor">
-            <a:schemeClr val="tx1"/>
-          </a:fontRef>
-        </p:style>
-      </p:cxnSp>
       <p:sp>
         <p:nvSpPr>
           <p:cNvPr id="52" name="Flowchart: Decision 51"/>
@@ -17470,6 +16851,626 @@
           </a:p>
         </p:txBody>
       </p:sp>
+      <p:sp>
+        <p:nvSpPr>
+          <p:cNvPr id="75" name="Rectangle 74"/>
+          <p:cNvSpPr/>
+          <p:nvPr/>
+        </p:nvSpPr>
+        <p:spPr>
+          <a:xfrm>
+            <a:off x="4600144" y="596185"/>
+            <a:ext cx="3916390" cy="3040555"/>
+          </a:xfrm>
+          <a:prstGeom prst="rect">
+            <a:avLst/>
+          </a:prstGeom>
+        </p:spPr>
+        <p:style>
+          <a:lnRef idx="2">
+            <a:schemeClr val="accent6"/>
+          </a:lnRef>
+          <a:fillRef idx="1">
+            <a:schemeClr val="lt1"/>
+          </a:fillRef>
+          <a:effectRef idx="0">
+            <a:schemeClr val="accent6"/>
+          </a:effectRef>
+          <a:fontRef idx="minor">
+            <a:schemeClr val="dk1"/>
+          </a:fontRef>
+        </p:style>
+        <p:txBody>
+          <a:bodyPr rtlCol="0" anchor="ctr"/>
+          <a:lstStyle/>
+          <a:p>
+            <a:pPr algn="ctr"/>
+            <a:endParaRPr lang="en-US"/>
+          </a:p>
+        </p:txBody>
+      </p:sp>
+      <p:sp>
+        <p:nvSpPr>
+          <p:cNvPr id="76" name="Rectangle 75"/>
+          <p:cNvSpPr/>
+          <p:nvPr/>
+        </p:nvSpPr>
+        <p:spPr>
+          <a:xfrm>
+            <a:off x="4767517" y="2935410"/>
+            <a:ext cx="124691" cy="124691"/>
+          </a:xfrm>
+          <a:prstGeom prst="rect">
+            <a:avLst/>
+          </a:prstGeom>
+          <a:solidFill>
+            <a:schemeClr val="accent1"/>
+          </a:solidFill>
+        </p:spPr>
+        <p:style>
+          <a:lnRef idx="2">
+            <a:schemeClr val="accent1">
+              <a:shade val="50000"/>
+            </a:schemeClr>
+          </a:lnRef>
+          <a:fillRef idx="1">
+            <a:schemeClr val="accent1"/>
+          </a:fillRef>
+          <a:effectRef idx="0">
+            <a:schemeClr val="accent1"/>
+          </a:effectRef>
+          <a:fontRef idx="minor">
+            <a:schemeClr val="lt1"/>
+          </a:fontRef>
+        </p:style>
+        <p:txBody>
+          <a:bodyPr rtlCol="0" anchor="ctr"/>
+          <a:lstStyle/>
+          <a:p>
+            <a:pPr algn="ctr"/>
+            <a:endParaRPr lang="en-US"/>
+          </a:p>
+        </p:txBody>
+      </p:sp>
+      <p:sp>
+        <p:nvSpPr>
+          <p:cNvPr id="77" name="Rectangle 76"/>
+          <p:cNvSpPr/>
+          <p:nvPr/>
+        </p:nvSpPr>
+        <p:spPr>
+          <a:xfrm>
+            <a:off x="5129256" y="2906615"/>
+            <a:ext cx="124691" cy="124691"/>
+          </a:xfrm>
+          <a:prstGeom prst="rect">
+            <a:avLst/>
+          </a:prstGeom>
+          <a:solidFill>
+            <a:schemeClr val="accent1"/>
+          </a:solidFill>
+        </p:spPr>
+        <p:style>
+          <a:lnRef idx="2">
+            <a:schemeClr val="accent1">
+              <a:shade val="50000"/>
+            </a:schemeClr>
+          </a:lnRef>
+          <a:fillRef idx="1">
+            <a:schemeClr val="accent1"/>
+          </a:fillRef>
+          <a:effectRef idx="0">
+            <a:schemeClr val="accent1"/>
+          </a:effectRef>
+          <a:fontRef idx="minor">
+            <a:schemeClr val="lt1"/>
+          </a:fontRef>
+        </p:style>
+        <p:txBody>
+          <a:bodyPr rtlCol="0" anchor="ctr"/>
+          <a:lstStyle/>
+          <a:p>
+            <a:pPr algn="ctr"/>
+            <a:endParaRPr lang="en-US"/>
+          </a:p>
+        </p:txBody>
+      </p:sp>
+      <p:sp>
+        <p:nvSpPr>
+          <p:cNvPr id="78" name="Rectangle 77"/>
+          <p:cNvSpPr/>
+          <p:nvPr/>
+        </p:nvSpPr>
+        <p:spPr>
+          <a:xfrm>
+            <a:off x="4914511" y="2411129"/>
+            <a:ext cx="124691" cy="124691"/>
+          </a:xfrm>
+          <a:prstGeom prst="rect">
+            <a:avLst/>
+          </a:prstGeom>
+          <a:solidFill>
+            <a:schemeClr val="accent1"/>
+          </a:solidFill>
+        </p:spPr>
+        <p:style>
+          <a:lnRef idx="2">
+            <a:schemeClr val="accent1">
+              <a:shade val="50000"/>
+            </a:schemeClr>
+          </a:lnRef>
+          <a:fillRef idx="1">
+            <a:schemeClr val="accent1"/>
+          </a:fillRef>
+          <a:effectRef idx="0">
+            <a:schemeClr val="accent1"/>
+          </a:effectRef>
+          <a:fontRef idx="minor">
+            <a:schemeClr val="lt1"/>
+          </a:fontRef>
+        </p:style>
+        <p:txBody>
+          <a:bodyPr rtlCol="0" anchor="ctr"/>
+          <a:lstStyle/>
+          <a:p>
+            <a:pPr algn="ctr"/>
+            <a:endParaRPr lang="en-US"/>
+          </a:p>
+        </p:txBody>
+      </p:sp>
+      <p:sp>
+        <p:nvSpPr>
+          <p:cNvPr id="79" name="Rectangle 78"/>
+          <p:cNvSpPr/>
+          <p:nvPr/>
+        </p:nvSpPr>
+        <p:spPr>
+          <a:xfrm>
+            <a:off x="6782437" y="2535820"/>
+            <a:ext cx="124691" cy="124691"/>
+          </a:xfrm>
+          <a:prstGeom prst="rect">
+            <a:avLst/>
+          </a:prstGeom>
+          <a:solidFill>
+            <a:srgbClr val="00B0F0"/>
+          </a:solidFill>
+        </p:spPr>
+        <p:style>
+          <a:lnRef idx="2">
+            <a:schemeClr val="accent1">
+              <a:shade val="50000"/>
+            </a:schemeClr>
+          </a:lnRef>
+          <a:fillRef idx="1">
+            <a:schemeClr val="accent1"/>
+          </a:fillRef>
+          <a:effectRef idx="0">
+            <a:schemeClr val="accent1"/>
+          </a:effectRef>
+          <a:fontRef idx="minor">
+            <a:schemeClr val="lt1"/>
+          </a:fontRef>
+        </p:style>
+        <p:txBody>
+          <a:bodyPr rtlCol="0" anchor="ctr"/>
+          <a:lstStyle/>
+          <a:p>
+            <a:pPr algn="ctr"/>
+            <a:endParaRPr lang="en-US"/>
+          </a:p>
+        </p:txBody>
+      </p:sp>
+      <p:sp>
+        <p:nvSpPr>
+          <p:cNvPr id="80" name="Rectangle 79"/>
+          <p:cNvSpPr/>
+          <p:nvPr/>
+        </p:nvSpPr>
+        <p:spPr>
+          <a:xfrm>
+            <a:off x="7270554" y="2231686"/>
+            <a:ext cx="124691" cy="124691"/>
+          </a:xfrm>
+          <a:prstGeom prst="rect">
+            <a:avLst/>
+          </a:prstGeom>
+          <a:solidFill>
+            <a:srgbClr val="00B0F0"/>
+          </a:solidFill>
+        </p:spPr>
+        <p:style>
+          <a:lnRef idx="2">
+            <a:schemeClr val="accent1">
+              <a:shade val="50000"/>
+            </a:schemeClr>
+          </a:lnRef>
+          <a:fillRef idx="1">
+            <a:schemeClr val="accent1"/>
+          </a:fillRef>
+          <a:effectRef idx="0">
+            <a:schemeClr val="accent1"/>
+          </a:effectRef>
+          <a:fontRef idx="minor">
+            <a:schemeClr val="lt1"/>
+          </a:fontRef>
+        </p:style>
+        <p:txBody>
+          <a:bodyPr rtlCol="0" anchor="ctr"/>
+          <a:lstStyle/>
+          <a:p>
+            <a:pPr algn="ctr"/>
+            <a:endParaRPr lang="en-US"/>
+          </a:p>
+        </p:txBody>
+      </p:sp>
+      <p:sp>
+        <p:nvSpPr>
+          <p:cNvPr id="81" name="Rectangle 80"/>
+          <p:cNvSpPr/>
+          <p:nvPr/>
+        </p:nvSpPr>
+        <p:spPr>
+          <a:xfrm>
+            <a:off x="7780821" y="2210396"/>
+            <a:ext cx="124691" cy="124691"/>
+          </a:xfrm>
+          <a:prstGeom prst="rect">
+            <a:avLst/>
+          </a:prstGeom>
+          <a:solidFill>
+            <a:srgbClr val="00B0F0"/>
+          </a:solidFill>
+        </p:spPr>
+        <p:style>
+          <a:lnRef idx="2">
+            <a:schemeClr val="accent1">
+              <a:shade val="50000"/>
+            </a:schemeClr>
+          </a:lnRef>
+          <a:fillRef idx="1">
+            <a:schemeClr val="accent1"/>
+          </a:fillRef>
+          <a:effectRef idx="0">
+            <a:schemeClr val="accent1"/>
+          </a:effectRef>
+          <a:fontRef idx="minor">
+            <a:schemeClr val="lt1"/>
+          </a:fontRef>
+        </p:style>
+        <p:txBody>
+          <a:bodyPr rtlCol="0" anchor="ctr"/>
+          <a:lstStyle/>
+          <a:p>
+            <a:pPr algn="ctr"/>
+            <a:endParaRPr lang="en-US"/>
+          </a:p>
+        </p:txBody>
+      </p:sp>
+      <p:sp>
+        <p:nvSpPr>
+          <p:cNvPr id="82" name="Rectangle 81"/>
+          <p:cNvSpPr/>
+          <p:nvPr/>
+        </p:nvSpPr>
+        <p:spPr>
+          <a:xfrm>
+            <a:off x="7718476" y="2829017"/>
+            <a:ext cx="124691" cy="124691"/>
+          </a:xfrm>
+          <a:prstGeom prst="rect">
+            <a:avLst/>
+          </a:prstGeom>
+          <a:solidFill>
+            <a:srgbClr val="00B0F0"/>
+          </a:solidFill>
+        </p:spPr>
+        <p:style>
+          <a:lnRef idx="2">
+            <a:schemeClr val="accent1">
+              <a:shade val="50000"/>
+            </a:schemeClr>
+          </a:lnRef>
+          <a:fillRef idx="1">
+            <a:schemeClr val="accent1"/>
+          </a:fillRef>
+          <a:effectRef idx="0">
+            <a:schemeClr val="accent1"/>
+          </a:effectRef>
+          <a:fontRef idx="minor">
+            <a:schemeClr val="lt1"/>
+          </a:fontRef>
+        </p:style>
+        <p:txBody>
+          <a:bodyPr rtlCol="0" anchor="ctr"/>
+          <a:lstStyle/>
+          <a:p>
+            <a:pPr algn="ctr"/>
+            <a:endParaRPr lang="en-US"/>
+          </a:p>
+        </p:txBody>
+      </p:sp>
+      <p:sp>
+        <p:nvSpPr>
+          <p:cNvPr id="83" name="Rectangle 82"/>
+          <p:cNvSpPr/>
+          <p:nvPr/>
+        </p:nvSpPr>
+        <p:spPr>
+          <a:xfrm>
+            <a:off x="6486518" y="769858"/>
+            <a:ext cx="124691" cy="124691"/>
+          </a:xfrm>
+          <a:prstGeom prst="rect">
+            <a:avLst/>
+          </a:prstGeom>
+          <a:solidFill>
+            <a:srgbClr val="FFC000"/>
+          </a:solidFill>
+        </p:spPr>
+        <p:style>
+          <a:lnRef idx="2">
+            <a:schemeClr val="accent1">
+              <a:shade val="50000"/>
+            </a:schemeClr>
+          </a:lnRef>
+          <a:fillRef idx="1">
+            <a:schemeClr val="accent1"/>
+          </a:fillRef>
+          <a:effectRef idx="0">
+            <a:schemeClr val="accent1"/>
+          </a:effectRef>
+          <a:fontRef idx="minor">
+            <a:schemeClr val="lt1"/>
+          </a:fontRef>
+        </p:style>
+        <p:txBody>
+          <a:bodyPr rtlCol="0" anchor="ctr"/>
+          <a:lstStyle/>
+          <a:p>
+            <a:pPr algn="ctr"/>
+            <a:endParaRPr lang="en-US"/>
+          </a:p>
+        </p:txBody>
+      </p:sp>
+      <p:sp>
+        <p:nvSpPr>
+          <p:cNvPr id="84" name="Rectangle 83"/>
+          <p:cNvSpPr/>
+          <p:nvPr/>
+        </p:nvSpPr>
+        <p:spPr>
+          <a:xfrm>
+            <a:off x="6084737" y="1140468"/>
+            <a:ext cx="124691" cy="124691"/>
+          </a:xfrm>
+          <a:prstGeom prst="rect">
+            <a:avLst/>
+          </a:prstGeom>
+          <a:solidFill>
+            <a:srgbClr val="FFC000"/>
+          </a:solidFill>
+        </p:spPr>
+        <p:style>
+          <a:lnRef idx="2">
+            <a:schemeClr val="accent1">
+              <a:shade val="50000"/>
+            </a:schemeClr>
+          </a:lnRef>
+          <a:fillRef idx="1">
+            <a:schemeClr val="accent1"/>
+          </a:fillRef>
+          <a:effectRef idx="0">
+            <a:schemeClr val="accent1"/>
+          </a:effectRef>
+          <a:fontRef idx="minor">
+            <a:schemeClr val="lt1"/>
+          </a:fontRef>
+        </p:style>
+        <p:txBody>
+          <a:bodyPr rtlCol="0" anchor="ctr"/>
+          <a:lstStyle/>
+          <a:p>
+            <a:pPr algn="ctr"/>
+            <a:endParaRPr lang="en-US"/>
+          </a:p>
+        </p:txBody>
+      </p:sp>
+      <p:sp>
+        <p:nvSpPr>
+          <p:cNvPr id="85" name="Rectangle 84"/>
+          <p:cNvSpPr/>
+          <p:nvPr/>
+        </p:nvSpPr>
+        <p:spPr>
+          <a:xfrm>
+            <a:off x="6740603" y="1306723"/>
+            <a:ext cx="124691" cy="124691"/>
+          </a:xfrm>
+          <a:prstGeom prst="rect">
+            <a:avLst/>
+          </a:prstGeom>
+          <a:solidFill>
+            <a:srgbClr val="FFC000"/>
+          </a:solidFill>
+        </p:spPr>
+        <p:style>
+          <a:lnRef idx="2">
+            <a:schemeClr val="accent1">
+              <a:shade val="50000"/>
+            </a:schemeClr>
+          </a:lnRef>
+          <a:fillRef idx="1">
+            <a:schemeClr val="accent1"/>
+          </a:fillRef>
+          <a:effectRef idx="0">
+            <a:schemeClr val="accent1"/>
+          </a:effectRef>
+          <a:fontRef idx="minor">
+            <a:schemeClr val="lt1"/>
+          </a:fontRef>
+        </p:style>
+        <p:txBody>
+          <a:bodyPr rtlCol="0" anchor="ctr"/>
+          <a:lstStyle/>
+          <a:p>
+            <a:pPr algn="ctr"/>
+            <a:endParaRPr lang="en-US"/>
+          </a:p>
+        </p:txBody>
+      </p:sp>
+      <p:sp>
+        <p:nvSpPr>
+          <p:cNvPr id="86" name="Rectangle 85"/>
+          <p:cNvSpPr/>
+          <p:nvPr/>
+        </p:nvSpPr>
+        <p:spPr>
+          <a:xfrm>
+            <a:off x="6022391" y="1575154"/>
+            <a:ext cx="124691" cy="124691"/>
+          </a:xfrm>
+          <a:prstGeom prst="rect">
+            <a:avLst/>
+          </a:prstGeom>
+          <a:solidFill>
+            <a:srgbClr val="FFC000"/>
+          </a:solidFill>
+        </p:spPr>
+        <p:style>
+          <a:lnRef idx="2">
+            <a:schemeClr val="accent1">
+              <a:shade val="50000"/>
+            </a:schemeClr>
+          </a:lnRef>
+          <a:fillRef idx="1">
+            <a:schemeClr val="accent1"/>
+          </a:fillRef>
+          <a:effectRef idx="0">
+            <a:schemeClr val="accent1"/>
+          </a:effectRef>
+          <a:fontRef idx="minor">
+            <a:schemeClr val="lt1"/>
+          </a:fontRef>
+        </p:style>
+        <p:txBody>
+          <a:bodyPr rtlCol="0" anchor="ctr"/>
+          <a:lstStyle/>
+          <a:p>
+            <a:pPr algn="ctr"/>
+            <a:endParaRPr lang="en-US"/>
+          </a:p>
+        </p:txBody>
+      </p:sp>
+      <p:sp>
+        <p:nvSpPr>
+          <p:cNvPr id="87" name="Oval 86"/>
+          <p:cNvSpPr/>
+          <p:nvPr/>
+        </p:nvSpPr>
+        <p:spPr>
+          <a:xfrm>
+            <a:off x="6427654" y="2272741"/>
+            <a:ext cx="140770" cy="140770"/>
+          </a:xfrm>
+          <a:prstGeom prst="ellipse">
+            <a:avLst/>
+          </a:prstGeom>
+          <a:solidFill>
+            <a:srgbClr val="7030A0"/>
+          </a:solidFill>
+        </p:spPr>
+        <p:style>
+          <a:lnRef idx="2">
+            <a:schemeClr val="accent1">
+              <a:shade val="50000"/>
+            </a:schemeClr>
+          </a:lnRef>
+          <a:fillRef idx="1">
+            <a:schemeClr val="accent1"/>
+          </a:fillRef>
+          <a:effectRef idx="0">
+            <a:schemeClr val="accent1"/>
+          </a:effectRef>
+          <a:fontRef idx="minor">
+            <a:schemeClr val="lt1"/>
+          </a:fontRef>
+        </p:style>
+        <p:txBody>
+          <a:bodyPr rtlCol="0" anchor="ctr"/>
+          <a:lstStyle/>
+          <a:p>
+            <a:pPr algn="ctr"/>
+            <a:endParaRPr lang="en-US"/>
+          </a:p>
+        </p:txBody>
+      </p:sp>
+      <p:cxnSp>
+        <p:nvCxnSpPr>
+          <p:cNvPr id="88" name="Straight Connector 87"/>
+          <p:cNvCxnSpPr>
+            <a:stCxn id="87" idx="1"/>
+            <a:endCxn id="86" idx="2"/>
+          </p:cNvCxnSpPr>
+          <p:nvPr/>
+        </p:nvCxnSpPr>
+        <p:spPr>
+          <a:xfrm flipH="1" flipV="1">
+            <a:off x="6084737" y="1699845"/>
+            <a:ext cx="363532" cy="593511"/>
+          </a:xfrm>
+          <a:prstGeom prst="line">
+            <a:avLst/>
+          </a:prstGeom>
+        </p:spPr>
+        <p:style>
+          <a:lnRef idx="1">
+            <a:schemeClr val="accent1"/>
+          </a:lnRef>
+          <a:fillRef idx="0">
+            <a:schemeClr val="accent1"/>
+          </a:fillRef>
+          <a:effectRef idx="0">
+            <a:schemeClr val="accent1"/>
+          </a:effectRef>
+          <a:fontRef idx="minor">
+            <a:schemeClr val="tx1"/>
+          </a:fontRef>
+        </p:style>
+      </p:cxnSp>
+      <p:cxnSp>
+        <p:nvCxnSpPr>
+          <p:cNvPr id="89" name="Straight Connector 88"/>
+          <p:cNvCxnSpPr>
+            <a:stCxn id="87" idx="5"/>
+            <a:endCxn id="79" idx="1"/>
+          </p:cNvCxnSpPr>
+          <p:nvPr/>
+        </p:nvCxnSpPr>
+        <p:spPr>
+          <a:xfrm>
+            <a:off x="6547809" y="2392896"/>
+            <a:ext cx="234628" cy="205270"/>
+          </a:xfrm>
+          <a:prstGeom prst="line">
+            <a:avLst/>
+          </a:prstGeom>
+        </p:spPr>
+        <p:style>
+          <a:lnRef idx="1">
+            <a:schemeClr val="accent1"/>
+          </a:lnRef>
+          <a:fillRef idx="0">
+            <a:schemeClr val="accent1"/>
+          </a:fillRef>
+          <a:effectRef idx="0">
+            <a:schemeClr val="accent1"/>
+          </a:effectRef>
+          <a:fontRef idx="minor">
+            <a:schemeClr val="tx1"/>
+          </a:fontRef>
+        </p:style>
+      </p:cxnSp>
     </p:spTree>
     <p:extLst>
       <p:ext uri="{BB962C8B-B14F-4D97-AF65-F5344CB8AC3E}">
@@ -17808,7 +17809,7 @@
                                           </p:stCondLst>
                                         </p:cTn>
                                         <p:tgtEl>
-                                          <p:spTgt spid="34"/>
+                                          <p:spTgt spid="87"/>
                                         </p:tgtEl>
                                         <p:attrNameLst>
                                           <p:attrName>style.visibility</p:attrName>
@@ -17822,7 +17823,7 @@
                                       <p:cBhvr>
                                         <p:cTn id="33" dur="500"/>
                                         <p:tgtEl>
-                                          <p:spTgt spid="34"/>
+                                          <p:spTgt spid="87"/>
                                         </p:tgtEl>
                                       </p:cBhvr>
                                     </p:animEffect>
@@ -17949,7 +17950,7 @@
                                           </p:stCondLst>
                                         </p:cTn>
                                         <p:tgtEl>
-                                          <p:spTgt spid="48"/>
+                                          <p:spTgt spid="88"/>
                                         </p:tgtEl>
                                         <p:attrNameLst>
                                           <p:attrName>style.visibility</p:attrName>
@@ -17963,7 +17964,7 @@
                                       <p:cBhvr>
                                         <p:cTn id="46" dur="500"/>
                                         <p:tgtEl>
-                                          <p:spTgt spid="48"/>
+                                          <p:spTgt spid="88"/>
                                         </p:tgtEl>
                                       </p:cBhvr>
                                     </p:animEffect>
@@ -17984,7 +17985,7 @@
                                           </p:stCondLst>
                                         </p:cTn>
                                         <p:tgtEl>
-                                          <p:spTgt spid="46"/>
+                                          <p:spTgt spid="89"/>
                                         </p:tgtEl>
                                         <p:attrNameLst>
                                           <p:attrName>style.visibility</p:attrName>
@@ -17998,7 +17999,7 @@
                                       <p:cBhvr>
                                         <p:cTn id="49" dur="500"/>
                                         <p:tgtEl>
-                                          <p:spTgt spid="46"/>
+                                          <p:spTgt spid="89"/>
                                         </p:tgtEl>
                                       </p:cBhvr>
                                     </p:animEffect>
@@ -18420,7 +18421,6 @@
       </p:par>
     </p:tnLst>
     <p:bldLst>
-      <p:bldP spid="34" grpId="0" animBg="1"/>
       <p:bldP spid="35" grpId="0" animBg="1"/>
       <p:bldP spid="36" grpId="0" animBg="1"/>
       <p:bldP spid="37" grpId="0" animBg="1"/>
@@ -18431,6 +18431,7 @@
       <p:bldP spid="60" grpId="0"/>
       <p:bldP spid="63" grpId="0" animBg="1"/>
       <p:bldP spid="68" grpId="0"/>
+      <p:bldP spid="87" grpId="0" animBg="1"/>
     </p:bldLst>
   </p:timing>
 </p:sld>

</xml_diff>